<commit_message>
Minor changes to various items
Powerpoints, Prog03 chapter, and a few small changes to some C# projects
</commit_message>
<xml_diff>
--- a/Chap/Prog03/Presentations/DataStructures.pptx
+++ b/Chap/Prog03/Presentations/DataStructures.pptx
@@ -5,12 +5,13 @@
     <p:sldMasterId id="2147483648" r:id="rId1"/>
   </p:sldMasterIdLst>
   <p:sldIdLst>
-    <p:sldId id="302" r:id="rId2"/>
-    <p:sldId id="304" r:id="rId3"/>
-    <p:sldId id="305" r:id="rId4"/>
-    <p:sldId id="303" r:id="rId5"/>
-    <p:sldId id="301" r:id="rId6"/>
-    <p:sldId id="306" r:id="rId7"/>
+    <p:sldId id="307" r:id="rId2"/>
+    <p:sldId id="302" r:id="rId3"/>
+    <p:sldId id="304" r:id="rId4"/>
+    <p:sldId id="305" r:id="rId5"/>
+    <p:sldId id="303" r:id="rId6"/>
+    <p:sldId id="301" r:id="rId7"/>
+    <p:sldId id="306" r:id="rId8"/>
   </p:sldIdLst>
   <p:sldSz cx="12192000" cy="6858000"/>
   <p:notesSz cx="6858000" cy="9144000"/>
@@ -248,7 +249,7 @@
           <a:p>
             <a:fld id="{E15B7D8E-2A20-4C0E-991C-872DBB7459A8}" type="datetimeFigureOut">
               <a:rPr lang="da-DK" smtClean="0"/>
-              <a:t>18-09-2017</a:t>
+              <a:t>19-09-2018</a:t>
             </a:fld>
             <a:endParaRPr lang="da-DK"/>
           </a:p>
@@ -418,7 +419,7 @@
           <a:p>
             <a:fld id="{E15B7D8E-2A20-4C0E-991C-872DBB7459A8}" type="datetimeFigureOut">
               <a:rPr lang="da-DK" smtClean="0"/>
-              <a:t>18-09-2017</a:t>
+              <a:t>19-09-2018</a:t>
             </a:fld>
             <a:endParaRPr lang="da-DK"/>
           </a:p>
@@ -598,7 +599,7 @@
           <a:p>
             <a:fld id="{E15B7D8E-2A20-4C0E-991C-872DBB7459A8}" type="datetimeFigureOut">
               <a:rPr lang="da-DK" smtClean="0"/>
-              <a:t>18-09-2017</a:t>
+              <a:t>19-09-2018</a:t>
             </a:fld>
             <a:endParaRPr lang="da-DK"/>
           </a:p>
@@ -768,7 +769,7 @@
           <a:p>
             <a:fld id="{E15B7D8E-2A20-4C0E-991C-872DBB7459A8}" type="datetimeFigureOut">
               <a:rPr lang="da-DK" smtClean="0"/>
-              <a:t>18-09-2017</a:t>
+              <a:t>19-09-2018</a:t>
             </a:fld>
             <a:endParaRPr lang="da-DK"/>
           </a:p>
@@ -1014,7 +1015,7 @@
           <a:p>
             <a:fld id="{E15B7D8E-2A20-4C0E-991C-872DBB7459A8}" type="datetimeFigureOut">
               <a:rPr lang="da-DK" smtClean="0"/>
-              <a:t>18-09-2017</a:t>
+              <a:t>19-09-2018</a:t>
             </a:fld>
             <a:endParaRPr lang="da-DK"/>
           </a:p>
@@ -1246,7 +1247,7 @@
           <a:p>
             <a:fld id="{E15B7D8E-2A20-4C0E-991C-872DBB7459A8}" type="datetimeFigureOut">
               <a:rPr lang="da-DK" smtClean="0"/>
-              <a:t>18-09-2017</a:t>
+              <a:t>19-09-2018</a:t>
             </a:fld>
             <a:endParaRPr lang="da-DK"/>
           </a:p>
@@ -1613,7 +1614,7 @@
           <a:p>
             <a:fld id="{E15B7D8E-2A20-4C0E-991C-872DBB7459A8}" type="datetimeFigureOut">
               <a:rPr lang="da-DK" smtClean="0"/>
-              <a:t>18-09-2017</a:t>
+              <a:t>19-09-2018</a:t>
             </a:fld>
             <a:endParaRPr lang="da-DK"/>
           </a:p>
@@ -1731,7 +1732,7 @@
           <a:p>
             <a:fld id="{E15B7D8E-2A20-4C0E-991C-872DBB7459A8}" type="datetimeFigureOut">
               <a:rPr lang="da-DK" smtClean="0"/>
-              <a:t>18-09-2017</a:t>
+              <a:t>19-09-2018</a:t>
             </a:fld>
             <a:endParaRPr lang="da-DK"/>
           </a:p>
@@ -1826,7 +1827,7 @@
           <a:p>
             <a:fld id="{E15B7D8E-2A20-4C0E-991C-872DBB7459A8}" type="datetimeFigureOut">
               <a:rPr lang="da-DK" smtClean="0"/>
-              <a:t>18-09-2017</a:t>
+              <a:t>19-09-2018</a:t>
             </a:fld>
             <a:endParaRPr lang="da-DK"/>
           </a:p>
@@ -2103,7 +2104,7 @@
           <a:p>
             <a:fld id="{E15B7D8E-2A20-4C0E-991C-872DBB7459A8}" type="datetimeFigureOut">
               <a:rPr lang="da-DK" smtClean="0"/>
-              <a:t>18-09-2017</a:t>
+              <a:t>19-09-2018</a:t>
             </a:fld>
             <a:endParaRPr lang="da-DK"/>
           </a:p>
@@ -2356,7 +2357,7 @@
           <a:p>
             <a:fld id="{E15B7D8E-2A20-4C0E-991C-872DBB7459A8}" type="datetimeFigureOut">
               <a:rPr lang="da-DK" smtClean="0"/>
-              <a:t>18-09-2017</a:t>
+              <a:t>19-09-2018</a:t>
             </a:fld>
             <a:endParaRPr lang="da-DK"/>
           </a:p>
@@ -2569,7 +2570,7 @@
           <a:p>
             <a:fld id="{E15B7D8E-2A20-4C0E-991C-872DBB7459A8}" type="datetimeFigureOut">
               <a:rPr lang="da-DK" smtClean="0"/>
-              <a:t>18-09-2017</a:t>
+              <a:t>19-09-2018</a:t>
             </a:fld>
             <a:endParaRPr lang="da-DK"/>
           </a:p>
@@ -2974,6 +2975,87 @@
           <a:chExt cx="0" cy="0"/>
         </a:xfrm>
       </p:grpSpPr>
+      <p:sp>
+        <p:nvSpPr>
+          <p:cNvPr id="2" name="Titel 1"/>
+          <p:cNvSpPr>
+            <a:spLocks noGrp="1"/>
+          </p:cNvSpPr>
+          <p:nvPr>
+            <p:ph type="ctrTitle"/>
+          </p:nvPr>
+        </p:nvSpPr>
+        <p:spPr>
+          <a:xfrm>
+            <a:off x="1175085" y="1100890"/>
+            <a:ext cx="9144000" cy="4120816"/>
+          </a:xfrm>
+        </p:spPr>
+        <p:txBody>
+          <a:bodyPr>
+            <a:normAutofit/>
+          </a:bodyPr>
+          <a:lstStyle/>
+          <a:p>
+            <a:r>
+              <a:rPr lang="da-DK" sz="9600" smtClean="0"/>
+              <a:t>Data Structures</a:t>
+            </a:r>
+            <a:br>
+              <a:rPr lang="da-DK" sz="9600" smtClean="0"/>
+            </a:br>
+            <a:r>
+              <a:rPr lang="da-DK" sz="9600" smtClean="0"/>
+              <a:t/>
+            </a:r>
+            <a:br>
+              <a:rPr lang="da-DK" sz="9600" smtClean="0"/>
+            </a:br>
+            <a:r>
+              <a:rPr lang="da-DK" sz="4800" smtClean="0"/>
+              <a:t>LinkedList, Queue and Stack</a:t>
+            </a:r>
+            <a:endParaRPr lang="da-DK" sz="4800"/>
+          </a:p>
+        </p:txBody>
+      </p:sp>
+    </p:spTree>
+    <p:extLst>
+      <p:ext uri="{BB962C8B-B14F-4D97-AF65-F5344CB8AC3E}">
+        <p14:creationId xmlns:p14="http://schemas.microsoft.com/office/powerpoint/2010/main" val="880119422"/>
+      </p:ext>
+    </p:extLst>
+  </p:cSld>
+  <p:clrMapOvr>
+    <a:masterClrMapping/>
+  </p:clrMapOvr>
+  <p:timing>
+    <p:tnLst>
+      <p:par>
+        <p:cTn id="1" dur="indefinite" restart="never" nodeType="tmRoot"/>
+      </p:par>
+    </p:tnLst>
+  </p:timing>
+</p:sld>
+</file>
+
+<file path=ppt/slides/slide2.xml><?xml version="1.0" encoding="utf-8"?>
+<p:sld xmlns:a="http://schemas.openxmlformats.org/drawingml/2006/main" xmlns:r="http://schemas.openxmlformats.org/officeDocument/2006/relationships" xmlns:p="http://schemas.openxmlformats.org/presentationml/2006/main">
+  <p:cSld>
+    <p:spTree>
+      <p:nvGrpSpPr>
+        <p:cNvPr id="1" name=""/>
+        <p:cNvGrpSpPr/>
+        <p:nvPr/>
+      </p:nvGrpSpPr>
+      <p:grpSpPr>
+        <a:xfrm>
+          <a:off x="0" y="0"/>
+          <a:ext cx="0" cy="0"/>
+          <a:chOff x="0" y="0"/>
+          <a:chExt cx="0" cy="0"/>
+        </a:xfrm>
+      </p:grpSpPr>
       <p:pic>
         <p:nvPicPr>
           <p:cNvPr id="2" name="Billede 1"/>
@@ -3007,10 +3089,17 @@
   <p:clrMapOvr>
     <a:masterClrMapping/>
   </p:clrMapOvr>
+  <p:timing>
+    <p:tnLst>
+      <p:par>
+        <p:cTn id="1" dur="indefinite" restart="never" nodeType="tmRoot"/>
+      </p:par>
+    </p:tnLst>
+  </p:timing>
 </p:sld>
 </file>
 
-<file path=ppt/slides/slide2.xml><?xml version="1.0" encoding="utf-8"?>
+<file path=ppt/slides/slide3.xml><?xml version="1.0" encoding="utf-8"?>
 <p:sld xmlns:a="http://schemas.openxmlformats.org/drawingml/2006/main" xmlns:r="http://schemas.openxmlformats.org/officeDocument/2006/relationships" xmlns:p="http://schemas.openxmlformats.org/presentationml/2006/main">
   <p:cSld>
     <p:spTree>
@@ -3061,10 +3150,17 @@
   <p:clrMapOvr>
     <a:masterClrMapping/>
   </p:clrMapOvr>
+  <p:timing>
+    <p:tnLst>
+      <p:par>
+        <p:cTn id="1" dur="indefinite" restart="never" nodeType="tmRoot"/>
+      </p:par>
+    </p:tnLst>
+  </p:timing>
 </p:sld>
 </file>
 
-<file path=ppt/slides/slide3.xml><?xml version="1.0" encoding="utf-8"?>
+<file path=ppt/slides/slide4.xml><?xml version="1.0" encoding="utf-8"?>
 <p:sld xmlns:a="http://schemas.openxmlformats.org/drawingml/2006/main" xmlns:r="http://schemas.openxmlformats.org/officeDocument/2006/relationships" xmlns:p="http://schemas.openxmlformats.org/presentationml/2006/main">
   <p:cSld>
     <p:spTree>
@@ -3118,7 +3214,7 @@
 </p:sld>
 </file>
 
-<file path=ppt/slides/slide4.xml><?xml version="1.0" encoding="utf-8"?>
+<file path=ppt/slides/slide5.xml><?xml version="1.0" encoding="utf-8"?>
 <p:sld xmlns:a="http://schemas.openxmlformats.org/drawingml/2006/main" xmlns:r="http://schemas.openxmlformats.org/officeDocument/2006/relationships" xmlns:p="http://schemas.openxmlformats.org/presentationml/2006/main">
   <p:cSld>
     <p:spTree>
@@ -3189,7 +3285,7 @@
 </p:sld>
 </file>
 
-<file path=ppt/slides/slide5.xml><?xml version="1.0" encoding="utf-8"?>
+<file path=ppt/slides/slide6.xml><?xml version="1.0" encoding="utf-8"?>
 <p:sld xmlns:a="http://schemas.openxmlformats.org/drawingml/2006/main" xmlns:r="http://schemas.openxmlformats.org/officeDocument/2006/relationships" xmlns:p="http://schemas.openxmlformats.org/presentationml/2006/main">
   <p:cSld>
     <p:spTree>
@@ -3260,7 +3356,7 @@
 </p:sld>
 </file>
 
-<file path=ppt/slides/slide6.xml><?xml version="1.0" encoding="utf-8"?>
+<file path=ppt/slides/slide7.xml><?xml version="1.0" encoding="utf-8"?>
 <p:sld xmlns:a="http://schemas.openxmlformats.org/drawingml/2006/main" xmlns:r="http://schemas.openxmlformats.org/officeDocument/2006/relationships" xmlns:p="http://schemas.openxmlformats.org/presentationml/2006/main">
   <p:cSld>
     <p:spTree>

</xml_diff>